<commit_message>
update diagrams and images
</commit_message>
<xml_diff>
--- a/docs/diagrams/LogicComponentSequenceDiagramForMarkDoneCommand.pptx
+++ b/docs/diagrams/LogicComponentSequenceDiagramForMarkDoneCommand.pptx
@@ -1014,7 +1014,7 @@
               </a:rPr>
               <a:t>‹#›</a:t>
             </a:fld>
-            <a:endParaRPr lang="en-US" sz="1200" b="0" i="0" u="none" strike="noStrike" cap="none">
+            <a:endParaRPr lang="en-US" sz="1200" b="0" i="0" u="none" strike="noStrike" cap="none" dirty="0">
               <a:solidFill>
                 <a:schemeClr val="dk1"/>
               </a:solidFill>
@@ -1634,7 +1634,7 @@
               </a:rPr>
               <a:t>‹#›</a:t>
             </a:fld>
-            <a:endParaRPr lang="en-US" sz="1200" b="0" i="0" u="none" strike="noStrike" cap="none">
+            <a:endParaRPr lang="en-US" sz="1200" b="0" i="0" u="none" strike="noStrike" cap="none" dirty="0">
               <a:solidFill>
                 <a:srgbClr val="888888"/>
               </a:solidFill>
@@ -2372,7 +2372,7 @@
               </a:rPr>
               <a:t>‹#›</a:t>
             </a:fld>
-            <a:endParaRPr lang="en-US" sz="1200">
+            <a:endParaRPr lang="en-US" sz="1200" dirty="0">
               <a:solidFill>
                 <a:srgbClr val="888888"/>
               </a:solidFill>
@@ -3110,7 +3110,7 @@
               </a:rPr>
               <a:t>‹#›</a:t>
             </a:fld>
-            <a:endParaRPr lang="en-US" sz="1200">
+            <a:endParaRPr lang="en-US" sz="1200" dirty="0">
               <a:solidFill>
                 <a:srgbClr val="888888"/>
               </a:solidFill>
@@ -3839,7 +3839,7 @@
               </a:rPr>
               <a:t>‹#›</a:t>
             </a:fld>
-            <a:endParaRPr lang="en-US" sz="1200">
+            <a:endParaRPr lang="en-US" sz="1200" dirty="0">
               <a:solidFill>
                 <a:srgbClr val="888888"/>
               </a:solidFill>
@@ -4577,7 +4577,7 @@
               </a:rPr>
               <a:t>‹#›</a:t>
             </a:fld>
-            <a:endParaRPr lang="en-US" sz="1200">
+            <a:endParaRPr lang="en-US" sz="1200" dirty="0">
               <a:solidFill>
                 <a:srgbClr val="888888"/>
               </a:solidFill>
@@ -5306,7 +5306,7 @@
               </a:rPr>
               <a:t>‹#›</a:t>
             </a:fld>
-            <a:endParaRPr lang="en-US" sz="1200">
+            <a:endParaRPr lang="en-US" sz="1200" dirty="0">
               <a:solidFill>
                 <a:srgbClr val="888888"/>
               </a:solidFill>
@@ -6256,7 +6256,7 @@
               </a:rPr>
               <a:t>‹#›</a:t>
             </a:fld>
-            <a:endParaRPr lang="en-US" sz="1200">
+            <a:endParaRPr lang="en-US" sz="1200" dirty="0">
               <a:solidFill>
                 <a:srgbClr val="888888"/>
               </a:solidFill>
@@ -7612,7 +7612,7 @@
               </a:rPr>
               <a:t>‹#›</a:t>
             </a:fld>
-            <a:endParaRPr lang="en-US" sz="1200">
+            <a:endParaRPr lang="en-US" sz="1200" dirty="0">
               <a:solidFill>
                 <a:srgbClr val="888888"/>
               </a:solidFill>
@@ -8138,7 +8138,7 @@
               </a:rPr>
               <a:t>‹#›</a:t>
             </a:fld>
-            <a:endParaRPr lang="en-US" sz="1200">
+            <a:endParaRPr lang="en-US" sz="1200" dirty="0">
               <a:solidFill>
                 <a:srgbClr val="888888"/>
               </a:solidFill>
@@ -9079,7 +9079,7 @@
               </a:rPr>
               <a:t>‹#›</a:t>
             </a:fld>
-            <a:endParaRPr lang="en-US" sz="1200">
+            <a:endParaRPr lang="en-US" sz="1200" dirty="0">
               <a:solidFill>
                 <a:srgbClr val="888888"/>
               </a:solidFill>
@@ -10011,7 +10011,7 @@
               </a:rPr>
               <a:t>‹#›</a:t>
             </a:fld>
-            <a:endParaRPr lang="en-US" sz="1200">
+            <a:endParaRPr lang="en-US" sz="1200" dirty="0">
               <a:solidFill>
                 <a:srgbClr val="888888"/>
               </a:solidFill>
@@ -10757,7 +10757,7 @@
               </a:rPr>
               <a:t>‹#›</a:t>
             </a:fld>
-            <a:endParaRPr lang="en-US" sz="1200" b="0" i="0" u="none" strike="noStrike" cap="none">
+            <a:endParaRPr lang="en-US" sz="1200" b="0" i="0" u="none" strike="noStrike" cap="none" dirty="0">
               <a:solidFill>
                 <a:srgbClr val="888888"/>
               </a:solidFill>
@@ -11283,7 +11283,7 @@
               <a:buNone/>
             </a:pPr>
             <a:r>
-              <a:rPr lang="en-US" sz="1200" b="1" i="0" u="none" strike="noStrike" cap="none">
+              <a:rPr lang="en-US" sz="1200" b="1" i="0" u="none" strike="noStrike" cap="none" dirty="0">
                 <a:solidFill>
                   <a:srgbClr val="0070C0"/>
                 </a:solidFill>
@@ -11338,7 +11338,7 @@
               <a:buNone/>
             </a:pPr>
             <a:r>
-              <a:rPr lang="en-US" sz="1600">
+              <a:rPr lang="en-US" sz="1600" dirty="0">
                 <a:solidFill>
                   <a:schemeClr val="lt1"/>
                 </a:solidFill>
@@ -11347,8 +11347,29 @@
                 <a:cs typeface="Calibri"/>
                 <a:sym typeface="Calibri"/>
               </a:rPr>
-              <a:t>:LogicManager</a:t>
+              <a:t>:</a:t>
             </a:r>
+            <a:r>
+              <a:rPr lang="en-US" sz="1600" dirty="0">
+                <a:solidFill>
+                  <a:schemeClr val="lt1"/>
+                </a:solidFill>
+                <a:latin typeface="Calibri"/>
+                <a:ea typeface="Calibri"/>
+                <a:cs typeface="Calibri"/>
+                <a:sym typeface="Calibri"/>
+              </a:rPr>
+              <a:t>LogicManager</a:t>
+            </a:r>
+            <a:endParaRPr lang="en-US" sz="1600" dirty="0">
+              <a:solidFill>
+                <a:schemeClr val="lt1"/>
+              </a:solidFill>
+              <a:latin typeface="Calibri"/>
+              <a:ea typeface="Calibri"/>
+              <a:cs typeface="Calibri"/>
+              <a:sym typeface="Calibri"/>
+            </a:endParaRPr>
           </a:p>
         </p:txBody>
       </p:sp>
@@ -11483,7 +11504,7 @@
               <a:buNone/>
             </a:pPr>
             <a:r>
-              <a:rPr lang="en-US" sz="1600">
+              <a:rPr lang="en-US" sz="1600" dirty="0">
                 <a:solidFill>
                   <a:schemeClr val="lt1"/>
                 </a:solidFill>
@@ -11628,7 +11649,7 @@
               <a:buNone/>
             </a:pPr>
             <a:r>
-              <a:rPr lang="en-US" sz="1600" dirty="0" err="1">
+              <a:rPr lang="en-US" sz="1600" dirty="0">
                 <a:solidFill>
                   <a:schemeClr val="lt1"/>
                 </a:solidFill>
@@ -11640,7 +11661,7 @@
               <a:t>m</a:t>
             </a:r>
             <a:r>
-              <a:rPr lang="en-US" sz="1600" dirty="0" err="1" smtClean="0">
+              <a:rPr lang="en-US" sz="1600" dirty="0" smtClean="0">
                 <a:solidFill>
                   <a:schemeClr val="lt1"/>
                 </a:solidFill>
@@ -11876,7 +11897,7 @@
               <a:buNone/>
             </a:pPr>
             <a:r>
-              <a:rPr lang="en-US" sz="1400">
+              <a:rPr lang="en-US" sz="1400" dirty="0">
                 <a:solidFill>
                   <a:srgbClr val="0070C0"/>
                 </a:solidFill>
@@ -11888,7 +11909,7 @@
               <a:t>execute</a:t>
             </a:r>
             <a:r>
-              <a:rPr lang="en-US" sz="1400" smtClean="0">
+              <a:rPr lang="en-US" sz="1400" dirty="0" smtClean="0">
                 <a:solidFill>
                   <a:srgbClr val="0070C0"/>
                 </a:solidFill>
@@ -11900,7 +11921,7 @@
               <a:t>(“</a:t>
             </a:r>
             <a:r>
-              <a:rPr lang="en-US" smtClean="0">
+              <a:rPr lang="en-US" dirty="0" smtClean="0">
                 <a:solidFill>
                   <a:srgbClr val="0070C0"/>
                 </a:solidFill>
@@ -11912,7 +11933,7 @@
               <a:t>mark</a:t>
             </a:r>
             <a:r>
-              <a:rPr lang="en-US" sz="1400" smtClean="0">
+              <a:rPr lang="en-US" sz="1400" dirty="0" smtClean="0">
                 <a:solidFill>
                   <a:srgbClr val="0070C0"/>
                 </a:solidFill>
@@ -11924,7 +11945,7 @@
               <a:t> </a:t>
             </a:r>
             <a:r>
-              <a:rPr lang="en-US" sz="1400">
+              <a:rPr lang="en-US" sz="1400" dirty="0">
                 <a:solidFill>
                   <a:srgbClr val="0070C0"/>
                 </a:solidFill>
@@ -11997,7 +12018,7 @@
               <a:buNone/>
             </a:pPr>
             <a:r>
-              <a:rPr lang="en-US" sz="1400" b="0" u="none">
+              <a:rPr lang="en-US" sz="1400" b="0" u="none" dirty="0">
                 <a:solidFill>
                   <a:srgbClr val="0070C0"/>
                 </a:solidFill>
@@ -12130,7 +12151,7 @@
               <a:buNone/>
             </a:pPr>
             <a:r>
-              <a:rPr lang="en-US" sz="1600">
+              <a:rPr lang="en-US" sz="1600" dirty="0">
                 <a:solidFill>
                   <a:schemeClr val="lt1"/>
                 </a:solidFill>
@@ -12422,7 +12443,7 @@
               <a:buNone/>
             </a:pPr>
             <a:r>
-              <a:rPr lang="en-US" dirty="0" err="1" smtClean="0">
+              <a:rPr lang="en-US" dirty="0" smtClean="0">
                 <a:solidFill>
                   <a:srgbClr val="7030A0"/>
                 </a:solidFill>
@@ -12493,7 +12514,7 @@
               <a:buNone/>
             </a:pPr>
             <a:r>
-              <a:rPr lang="en-US" sz="1200" b="0" u="none">
+              <a:rPr lang="en-US" sz="1200" b="0" u="none" dirty="0">
                 <a:solidFill>
                   <a:srgbClr val="0070C0"/>
                 </a:solidFill>
@@ -12540,7 +12561,7 @@
               <a:buNone/>
             </a:pPr>
             <a:r>
-              <a:rPr lang="en-US" sz="1400" b="0" u="none">
+              <a:rPr lang="en-US" sz="1400" b="0" u="none" dirty="0">
                 <a:solidFill>
                   <a:srgbClr val="0070C0"/>
                 </a:solidFill>
@@ -12552,7 +12573,7 @@
               <a:t>parse</a:t>
             </a:r>
             <a:r>
-              <a:rPr lang="en-US" sz="1400" b="0" u="none" smtClean="0">
+              <a:rPr lang="en-US" sz="1400" b="0" u="none" dirty="0" smtClean="0">
                 <a:solidFill>
                   <a:srgbClr val="0070C0"/>
                 </a:solidFill>
@@ -12564,7 +12585,7 @@
               <a:t>(“</a:t>
             </a:r>
             <a:r>
-              <a:rPr lang="en-US" smtClean="0">
+              <a:rPr lang="en-US" dirty="0" smtClean="0">
                 <a:solidFill>
                   <a:srgbClr val="0070C0"/>
                 </a:solidFill>
@@ -12576,7 +12597,7 @@
               <a:t>mark</a:t>
             </a:r>
             <a:r>
-              <a:rPr lang="en-US" sz="1400" b="0" u="none" smtClean="0">
+              <a:rPr lang="en-US" sz="1400" b="0" u="none" dirty="0" smtClean="0">
                 <a:solidFill>
                   <a:srgbClr val="0070C0"/>
                 </a:solidFill>
@@ -12588,7 +12609,7 @@
               <a:t> </a:t>
             </a:r>
             <a:r>
-              <a:rPr lang="en-US" sz="1400" b="0" u="none">
+              <a:rPr lang="en-US" sz="1400" b="0" u="none" dirty="0">
                 <a:solidFill>
                   <a:srgbClr val="0070C0"/>
                 </a:solidFill>
@@ -12635,7 +12656,7 @@
               <a:buNone/>
             </a:pPr>
             <a:r>
-              <a:rPr lang="en-US" sz="1400" b="0" u="none">
+              <a:rPr lang="en-US" sz="1400" b="0" u="none" dirty="0">
                 <a:solidFill>
                   <a:srgbClr val="0070C0"/>
                 </a:solidFill>
@@ -12682,7 +12703,7 @@
               <a:buNone/>
             </a:pPr>
             <a:r>
-              <a:rPr lang="en-US" sz="1400" b="0" u="none">
+              <a:rPr lang="en-US" sz="1400" b="0" u="none" dirty="0">
                 <a:solidFill>
                   <a:srgbClr val="0070C0"/>
                 </a:solidFill>
@@ -12737,7 +12758,7 @@
               <a:buNone/>
             </a:pPr>
             <a:r>
-              <a:rPr lang="en-US" sz="1600">
+              <a:rPr lang="en-US" sz="1600" dirty="0">
                 <a:solidFill>
                   <a:schemeClr val="lt1"/>
                 </a:solidFill>
@@ -12746,19 +12767,7 @@
                 <a:cs typeface="Calibri"/>
                 <a:sym typeface="Calibri"/>
               </a:rPr>
-              <a:t>result:Command</a:t>
-            </a:r>
-            <a:r>
-              <a:rPr lang="en-US" sz="1600" dirty="0">
-                <a:solidFill>
-                  <a:schemeClr val="lt1"/>
-                </a:solidFill>
-                <a:latin typeface="Calibri"/>
-                <a:ea typeface="Calibri"/>
-                <a:cs typeface="Calibri"/>
-                <a:sym typeface="Calibri"/>
-              </a:rPr>
-              <a:t> Result</a:t>
+              <a:t>result:Command Result</a:t>
             </a:r>
           </a:p>
         </p:txBody>
@@ -12949,7 +12958,7 @@
               <a:t>:</a:t>
             </a:r>
             <a:r>
-              <a:rPr lang="en-US" sz="1600" dirty="0" err="1" smtClean="0">
+              <a:rPr lang="en-US" sz="1600" dirty="0" smtClean="0">
                 <a:solidFill>
                   <a:schemeClr val="lt1"/>
                 </a:solidFill>
@@ -13311,7 +13320,7 @@
           <a:lstStyle/>
           <a:p>
             <a:pPr algn="ctr"/>
-            <a:endParaRPr lang="en-US">
+            <a:endParaRPr lang="en-US" dirty="0">
               <a:solidFill>
                 <a:schemeClr val="tx1"/>
               </a:solidFill>
@@ -13352,7 +13361,7 @@
               <a:buNone/>
             </a:pPr>
             <a:r>
-              <a:rPr lang="en-US" smtClean="0">
+              <a:rPr lang="en-US" dirty="0" smtClean="0">
                 <a:solidFill>
                   <a:srgbClr val="7030A0"/>
                 </a:solidFill>

</xml_diff>